<commit_message>
Update test reference report with updated placeholder implementations
</commit_message>
<xml_diff>
--- a/report-generator/tests/report_generator/cli/reference_output.pptx
+++ b/report-generator/tests/report_generator/cli/reference_output.pptx
@@ -35290,7 +35290,7 @@
             </a:r>
             <a:r>
               <a:rPr lang="en-US" sz="1800" dirty="0"/>
-              <a:t> on the SIG Architecture Quality model, above the market average. None</a:t>
+              <a:t> on the SIG Architecture Quality model, above the market average. </a:t>
             </a:r>
             <a:endParaRPr lang="en-US" sz="1800" dirty="0"/>
           </a:p>
@@ -39463,7 +39463,7 @@
           <a:p>
             <a:r>
               <a:rPr lang="en-US" dirty="0" err="1"/>
-              <a:t>Apr</a:t>
+              <a:t>APR</a:t>
             </a:r>
             <a:endParaRPr lang="en-NL"/>
           </a:p>
@@ -43662,7 +43662,7 @@
                   <a:schemeClr val="bg1"/>
                 </a:solidFill>
               </a:rPr>
-              <a:t>19</a:t>
+              <a:t>03</a:t>
             </a:r>
             <a:endParaRPr lang="en-US" sz="1200" b="1" dirty="0">
               <a:solidFill>
@@ -43682,7 +43682,7 @@
                   <a:schemeClr val="bg1"/>
                 </a:solidFill>
               </a:rPr>
-              <a:t>Sep</a:t>
+              <a:t>APR</a:t>
             </a:r>
             <a:endParaRPr lang="en-US" sz="1200" b="1" dirty="0">
               <a:solidFill>
@@ -46806,7 +46806,7 @@
                 </a:solidFill>
                 <a:latin typeface="Calibri" panose="020F0502020204030204"/>
               </a:rPr>
-              <a:t>None</a:t>
+              <a:t/>
             </a:r>
             <a:endParaRPr lang="en-US" sz="1600" dirty="0">
               <a:solidFill>

</xml_diff>